<commit_message>
Modified the powerpoint file
</commit_message>
<xml_diff>
--- a/DDS401 Team NI Case Study 1 Presentation.pptx
+++ b/DDS401 Team NI Case Study 1 Presentation.pptx
@@ -7,7 +7,8 @@
   <p:sldIdLst>
     <p:sldId id="256" r:id="rId2"/>
     <p:sldId id="257" r:id="rId3"/>
-    <p:sldId id="258" r:id="rId4"/>
+    <p:sldId id="259" r:id="rId4"/>
+    <p:sldId id="258" r:id="rId5"/>
   </p:sldIdLst>
   <p:sldSz cx="12192000" cy="6858000"/>
   <p:notesSz cx="6858000" cy="9144000"/>
@@ -106,6 +107,11 @@
       </a:defRPr>
     </a:lvl9pPr>
   </p:defaultTextStyle>
+  <p:extLst>
+    <p:ext uri="{EFAFB233-063F-42B5-8137-9DF3F51BA10A}">
+      <p15:sldGuideLst xmlns:p15="http://schemas.microsoft.com/office/powerpoint/2012/main"/>
+    </p:ext>
+  </p:extLst>
 </p:presentation>
 </file>
 
@@ -4385,7 +4391,7 @@
           <a:p>
             <a:fld id="{48A87A34-81AB-432B-8DAE-1953F412C126}" type="datetimeFigureOut">
               <a:rPr lang="en-US" dirty="0"/>
-              <a:t>1/8/2019</a:t>
+              <a:t>1/9/2019</a:t>
             </a:fld>
             <a:endParaRPr lang="en-US" dirty="0"/>
           </a:p>
@@ -4647,7 +4653,7 @@
           <a:p>
             <a:fld id="{48A87A34-81AB-432B-8DAE-1953F412C126}" type="datetimeFigureOut">
               <a:rPr lang="en-US" dirty="0"/>
-              <a:t>1/8/2019</a:t>
+              <a:t>1/9/2019</a:t>
             </a:fld>
             <a:endParaRPr lang="en-US" dirty="0"/>
           </a:p>
@@ -4838,7 +4844,7 @@
           <a:p>
             <a:fld id="{48A87A34-81AB-432B-8DAE-1953F412C126}" type="datetimeFigureOut">
               <a:rPr lang="en-US" dirty="0"/>
-              <a:t>1/8/2019</a:t>
+              <a:t>1/9/2019</a:t>
             </a:fld>
             <a:endParaRPr lang="en-US" dirty="0"/>
           </a:p>
@@ -5096,7 +5102,7 @@
           <a:p>
             <a:fld id="{48A87A34-81AB-432B-8DAE-1953F412C126}" type="datetimeFigureOut">
               <a:rPr lang="en-US" dirty="0"/>
-              <a:t>1/8/2019</a:t>
+              <a:t>1/9/2019</a:t>
             </a:fld>
             <a:endParaRPr lang="en-US" dirty="0"/>
           </a:p>
@@ -5525,7 +5531,7 @@
           <a:p>
             <a:fld id="{48A87A34-81AB-432B-8DAE-1953F412C126}" type="datetimeFigureOut">
               <a:rPr lang="en-US" dirty="0"/>
-              <a:t>1/8/2019</a:t>
+              <a:t>1/9/2019</a:t>
             </a:fld>
             <a:endParaRPr lang="en-US" dirty="0"/>
           </a:p>
@@ -6066,7 +6072,7 @@
           <a:p>
             <a:fld id="{48A87A34-81AB-432B-8DAE-1953F412C126}" type="datetimeFigureOut">
               <a:rPr lang="en-US" dirty="0"/>
-              <a:t>1/8/2019</a:t>
+              <a:t>1/9/2019</a:t>
             </a:fld>
             <a:endParaRPr lang="en-US" dirty="0"/>
           </a:p>
@@ -6781,7 +6787,7 @@
           <a:p>
             <a:fld id="{48A87A34-81AB-432B-8DAE-1953F412C126}" type="datetimeFigureOut">
               <a:rPr lang="en-US" dirty="0"/>
-              <a:t>1/8/2019</a:t>
+              <a:t>1/9/2019</a:t>
             </a:fld>
             <a:endParaRPr lang="en-US" dirty="0"/>
           </a:p>
@@ -6946,7 +6952,7 @@
           <a:p>
             <a:fld id="{48A87A34-81AB-432B-8DAE-1953F412C126}" type="datetimeFigureOut">
               <a:rPr lang="en-US" dirty="0"/>
-              <a:t>1/8/2019</a:t>
+              <a:t>1/9/2019</a:t>
             </a:fld>
             <a:endParaRPr lang="en-US" dirty="0"/>
           </a:p>
@@ -7121,7 +7127,7 @@
           <a:p>
             <a:fld id="{48A87A34-81AB-432B-8DAE-1953F412C126}" type="datetimeFigureOut">
               <a:rPr lang="en-US" dirty="0"/>
-              <a:t>1/8/2019</a:t>
+              <a:t>1/9/2019</a:t>
             </a:fld>
             <a:endParaRPr lang="en-US" dirty="0"/>
           </a:p>
@@ -7286,7 +7292,7 @@
           <a:p>
             <a:fld id="{48A87A34-81AB-432B-8DAE-1953F412C126}" type="datetimeFigureOut">
               <a:rPr lang="en-US" dirty="0"/>
-              <a:t>1/8/2019</a:t>
+              <a:t>1/9/2019</a:t>
             </a:fld>
             <a:endParaRPr lang="en-US" dirty="0"/>
           </a:p>
@@ -7531,7 +7537,7 @@
           <a:p>
             <a:fld id="{48A87A34-81AB-432B-8DAE-1953F412C126}" type="datetimeFigureOut">
               <a:rPr lang="en-US" dirty="0"/>
-              <a:t>1/8/2019</a:t>
+              <a:t>1/9/2019</a:t>
             </a:fld>
             <a:endParaRPr lang="en-US" dirty="0"/>
           </a:p>
@@ -7758,7 +7764,7 @@
           <a:p>
             <a:fld id="{48A87A34-81AB-432B-8DAE-1953F412C126}" type="datetimeFigureOut">
               <a:rPr lang="en-US" dirty="0"/>
-              <a:t>1/8/2019</a:t>
+              <a:t>1/9/2019</a:t>
             </a:fld>
             <a:endParaRPr lang="en-US" dirty="0"/>
           </a:p>
@@ -8134,7 +8140,7 @@
           <a:p>
             <a:fld id="{48A87A34-81AB-432B-8DAE-1953F412C126}" type="datetimeFigureOut">
               <a:rPr lang="en-US" dirty="0"/>
-              <a:t>1/8/2019</a:t>
+              <a:t>1/9/2019</a:t>
             </a:fld>
             <a:endParaRPr lang="en-US" dirty="0"/>
           </a:p>
@@ -8247,7 +8253,7 @@
           <a:p>
             <a:fld id="{48A87A34-81AB-432B-8DAE-1953F412C126}" type="datetimeFigureOut">
               <a:rPr lang="en-US" dirty="0"/>
-              <a:t>1/8/2019</a:t>
+              <a:t>1/9/2019</a:t>
             </a:fld>
             <a:endParaRPr lang="en-US" dirty="0"/>
           </a:p>
@@ -8337,7 +8343,7 @@
           <a:p>
             <a:fld id="{48A87A34-81AB-432B-8DAE-1953F412C126}" type="datetimeFigureOut">
               <a:rPr lang="en-US" dirty="0"/>
-              <a:t>1/8/2019</a:t>
+              <a:t>1/9/2019</a:t>
             </a:fld>
             <a:endParaRPr lang="en-US" dirty="0"/>
           </a:p>
@@ -8581,7 +8587,7 @@
           <a:p>
             <a:fld id="{48A87A34-81AB-432B-8DAE-1953F412C126}" type="datetimeFigureOut">
               <a:rPr lang="en-US" dirty="0"/>
-              <a:t>1/8/2019</a:t>
+              <a:t>1/9/2019</a:t>
             </a:fld>
             <a:endParaRPr lang="en-US" dirty="0"/>
           </a:p>
@@ -8856,7 +8862,7 @@
           <a:p>
             <a:fld id="{48A87A34-81AB-432B-8DAE-1953F412C126}" type="datetimeFigureOut">
               <a:rPr lang="en-US" dirty="0"/>
-              <a:t>1/8/2019</a:t>
+              <a:t>1/9/2019</a:t>
             </a:fld>
             <a:endParaRPr lang="en-US" dirty="0"/>
           </a:p>
@@ -11929,7 +11935,7 @@
             <a:fld id="{48A87A34-81AB-432B-8DAE-1953F412C126}" type="datetimeFigureOut">
               <a:rPr lang="en-US" dirty="0"/>
               <a:pPr/>
-              <a:t>1/8/2019</a:t>
+              <a:t>1/9/2019</a:t>
             </a:fld>
             <a:endParaRPr lang="en-US" dirty="0"/>
           </a:p>
@@ -12505,20 +12511,30 @@
         </p:nvSpPr>
         <p:spPr/>
         <p:txBody>
-          <a:bodyPr/>
+          <a:bodyPr>
+            <a:normAutofit fontScale="92500" lnSpcReduction="10000"/>
+          </a:bodyPr>
           <a:lstStyle/>
           <a:p>
-            <a:r>
-              <a:rPr lang="en-US" dirty="0"/>
-              <a:t>In this scenario we invented a brewery, </a:t>
-            </a:r>
             <a:r>
               <a:rPr lang="en-US" dirty="0" err="1"/>
               <a:t>ExploringNewBusiness</a:t>
             </a:r>
             <a:r>
               <a:rPr lang="en-US" dirty="0"/>
-              <a:t> brewery, who contracted our analytics firm, Natural Intelligence Inc., for analysis of their market strength.</a:t>
+              <a:t> (ENB) brewery, contacted Natural Intelligence Inc., for analysis of their market strength.</a:t>
+            </a:r>
+          </a:p>
+          <a:p>
+            <a:r>
+              <a:rPr lang="en-US" dirty="0"/>
+              <a:t>Market analysis of competitors to ENB’s Jupiter IPA brand</a:t>
+            </a:r>
+          </a:p>
+          <a:p>
+            <a:r>
+              <a:rPr lang="en-US" dirty="0"/>
+              <a:t>Investigate the relationship between the ABV (Alcohol By Volume) &amp; IBU (International Bitterness Unit)</a:t>
             </a:r>
           </a:p>
           <a:p>
@@ -12549,6 +12565,126 @@
 </file>
 
 <file path=ppt/slides/slide3.xml><?xml version="1.0" encoding="utf-8"?>
+<p:sld xmlns:a="http://schemas.openxmlformats.org/drawingml/2006/main" xmlns:r="http://schemas.openxmlformats.org/officeDocument/2006/relationships" xmlns:p="http://schemas.openxmlformats.org/presentationml/2006/main">
+  <p:cSld>
+    <p:spTree>
+      <p:nvGrpSpPr>
+        <p:cNvPr id="1" name=""/>
+        <p:cNvGrpSpPr/>
+        <p:nvPr/>
+      </p:nvGrpSpPr>
+      <p:grpSpPr>
+        <a:xfrm>
+          <a:off x="0" y="0"/>
+          <a:ext cx="0" cy="0"/>
+          <a:chOff x="0" y="0"/>
+          <a:chExt cx="0" cy="0"/>
+        </a:xfrm>
+      </p:grpSpPr>
+      <p:sp>
+        <p:nvSpPr>
+          <p:cNvPr id="2" name="Title 1">
+            <a:extLst>
+              <a:ext uri="{FF2B5EF4-FFF2-40B4-BE49-F238E27FC236}">
+                <a16:creationId xmlns:a16="http://schemas.microsoft.com/office/drawing/2014/main" id="{462C5885-D332-4A7E-B2D5-5482D2612A7F}"/>
+              </a:ext>
+            </a:extLst>
+          </p:cNvPr>
+          <p:cNvSpPr>
+            <a:spLocks noGrp="1"/>
+          </p:cNvSpPr>
+          <p:nvPr>
+            <p:ph type="title"/>
+          </p:nvPr>
+        </p:nvSpPr>
+        <p:spPr/>
+        <p:txBody>
+          <a:bodyPr/>
+          <a:lstStyle/>
+          <a:p>
+            <a:r>
+              <a:rPr lang="en-US" dirty="0"/>
+              <a:t>Deliverables	</a:t>
+            </a:r>
+          </a:p>
+        </p:txBody>
+      </p:sp>
+      <p:sp>
+        <p:nvSpPr>
+          <p:cNvPr id="3" name="Content Placeholder 2">
+            <a:extLst>
+              <a:ext uri="{FF2B5EF4-FFF2-40B4-BE49-F238E27FC236}">
+                <a16:creationId xmlns:a16="http://schemas.microsoft.com/office/drawing/2014/main" id="{1406E948-1880-4C5C-BD60-1E176318A482}"/>
+              </a:ext>
+            </a:extLst>
+          </p:cNvPr>
+          <p:cNvSpPr>
+            <a:spLocks noGrp="1"/>
+          </p:cNvSpPr>
+          <p:nvPr>
+            <p:ph idx="1"/>
+          </p:nvPr>
+        </p:nvSpPr>
+        <p:spPr>
+          <a:xfrm>
+            <a:off x="1143000" y="2249487"/>
+            <a:ext cx="9905999" cy="3541714"/>
+          </a:xfrm>
+        </p:spPr>
+        <p:txBody>
+          <a:bodyPr>
+            <a:normAutofit fontScale="92500" lnSpcReduction="10000"/>
+          </a:bodyPr>
+          <a:lstStyle/>
+          <a:p>
+            <a:r>
+              <a:rPr lang="en-US" dirty="0"/>
+              <a:t>Geographical analysis of breweries by state</a:t>
+            </a:r>
+          </a:p>
+          <a:p>
+            <a:endParaRPr lang="en-US" dirty="0"/>
+          </a:p>
+          <a:p>
+            <a:r>
+              <a:rPr lang="en-US" dirty="0"/>
+              <a:t>Statistical analysis of ABV and IBU by state</a:t>
+            </a:r>
+          </a:p>
+          <a:p>
+            <a:endParaRPr lang="en-US" dirty="0"/>
+          </a:p>
+          <a:p>
+            <a:r>
+              <a:rPr lang="en-US" dirty="0"/>
+              <a:t>Summary statistics of ABV</a:t>
+            </a:r>
+          </a:p>
+          <a:p>
+            <a:endParaRPr lang="en-US" dirty="0"/>
+          </a:p>
+          <a:p>
+            <a:r>
+              <a:rPr lang="en-US" dirty="0"/>
+              <a:t>Variable relationships &amp; recommendations </a:t>
+            </a:r>
+          </a:p>
+        </p:txBody>
+      </p:sp>
+    </p:spTree>
+    <p:extLst>
+      <p:ext uri="{BB962C8B-B14F-4D97-AF65-F5344CB8AC3E}">
+        <p14:creationId xmlns:p14="http://schemas.microsoft.com/office/powerpoint/2010/main" val="1972315497"/>
+      </p:ext>
+    </p:extLst>
+  </p:cSld>
+  <p:clrMapOvr>
+    <a:masterClrMapping/>
+  </p:clrMapOvr>
+</p:sld>
+</file>
+
+<file path=ppt/slides/slide4.xml><?xml version="1.0" encoding="utf-8"?>
 <p:sld xmlns:a="http://schemas.openxmlformats.org/drawingml/2006/main" xmlns:r="http://schemas.openxmlformats.org/officeDocument/2006/relationships" xmlns:p="http://schemas.openxmlformats.org/presentationml/2006/main">
   <p:cSld>
     <p:spTree>

</xml_diff>